<commit_message>
Upload resources for Introduction to jQuery Lab and Exercise
</commit_message>
<xml_diff>
--- a/JavaScript_For_FrontEnd/03. JavaScript-for-Front-End-Introduction-to-JQuery/03. JavaScript-for-Front-End-Introduction-to-JQuery.pptx
+++ b/JavaScript_For_FrontEnd/03. JavaScript-for-Front-End-Introduction-to-JQuery/03. JavaScript-for-Front-End-Introduction-to-JQuery.pptx
@@ -303,7 +303,7 @@
             <a:fld id="{FE5B4EDC-59C0-49C7-8ADA-5A781B329E02}" type="datetimeFigureOut">
               <a:rPr lang="en-US"/>
               <a:pPr/>
-              <a:t>7/3/2018</a:t>
+              <a:t>7/5/2018</a:t>
             </a:fld>
             <a:endParaRPr dirty="0"/>
           </a:p>
@@ -502,7 +502,7 @@
             <a:fld id="{F2D8D46A-B586-417D-BFBD-8C8FE0AAF762}" type="datetimeFigureOut">
               <a:rPr lang="en-US" smtClean="0"/>
               <a:pPr/>
-              <a:t>7/3/2018</a:t>
+              <a:t>7/5/2018</a:t>
             </a:fld>
             <a:endParaRPr lang="en-US" dirty="0"/>
           </a:p>
@@ -2375,7 +2375,7 @@
             <a:fld id="{055373AC-9AA7-423B-BA00-BA1C74164DBD}" type="datetime1">
               <a:rPr lang="en-US" smtClean="0"/>
               <a:pPr/>
-              <a:t>7/3/2018</a:t>
+              <a:t>7/5/2018</a:t>
             </a:fld>
             <a:endParaRPr lang="en-US" dirty="0"/>
           </a:p>
@@ -4140,7 +4140,7 @@
             <a:fld id="{055373AC-9AA7-423B-BA00-BA1C74164DBD}" type="datetime1">
               <a:rPr lang="en-US" smtClean="0"/>
               <a:pPr/>
-              <a:t>7/3/2018</a:t>
+              <a:t>7/5/2018</a:t>
             </a:fld>
             <a:endParaRPr lang="en-US" dirty="0"/>
           </a:p>
@@ -22806,7 +22806,7 @@
         </p:nvSpPr>
         <p:spPr>
           <a:xfrm>
-            <a:off x="11760200" y="6524625"/>
+            <a:off x="11657012" y="6553200"/>
             <a:ext cx="428625" cy="196850"/>
           </a:xfrm>
         </p:spPr>

</xml_diff>